<commit_message>
Tiny changes in wording
</commit_message>
<xml_diff>
--- a/Tower collapsing simulation.pptx
+++ b/Tower collapsing simulation.pptx
@@ -111,6 +111,11 @@
       </a:defRPr>
     </a:lvl9pPr>
   </p:defaultTextStyle>
+  <p:extLst>
+    <p:ext uri="{EFAFB233-063F-42B5-8137-9DF3F51BA10A}">
+      <p15:sldGuideLst xmlns:p15="http://schemas.microsoft.com/office/powerpoint/2012/main"/>
+    </p:ext>
+  </p:extLst>
 </p:presentation>
 </file>
 
@@ -4152,8 +4157,12 @@
               <a:buChar char="•"/>
             </a:pPr>
             <a:r>
+              <a:rPr lang="en-GB" sz="2800" smtClean="0"/>
+              <a:t>Might have </a:t>
+            </a:r>
+            <a:r>
               <a:rPr lang="en-GB" sz="2800" dirty="0" smtClean="0"/>
-              <a:t>Hopefully will have an option to add more towers</a:t>
+              <a:t>an option to add more towers</a:t>
             </a:r>
           </a:p>
           <a:p>
@@ -4576,7 +4585,7 @@
         </p:nvSpPr>
         <p:spPr>
           <a:xfrm rot="10800000">
-            <a:off x="8874075" y="4082195"/>
+            <a:off x="8874075" y="4159860"/>
             <a:ext cx="852853" cy="1014777"/>
           </a:xfrm>
           <a:prstGeom prst="bentArrow">

</xml_diff>